<commit_message>
Updated Lookuptables for the Modules
</commit_message>
<xml_diff>
--- a/documents/presentation/13-10-2021-Praesentation-editiert.pptx
+++ b/documents/presentation/13-10-2021-Praesentation-editiert.pptx
@@ -343,11 +343,11 @@
     </inkml:brush>
   </inkml:definitions>
   <inkml:trace contextRef="#ctx0" brushRef="#br0">670 3582 0,'21'0'16,"-21"-21"0,21 21-16,0 0 15,-21-21 1,21 0 46,-21 0-46,0 1 0,21 20-16,-21-21 15,0 0 1,0 0-16,0 0 16,0 0 15,-21 21 16,0 0-32,0 0-15,0 0 32,0 0-1,0 0-16,0 0 1,21 21-16,-21-21 16,21 21-16,-21 0 15,0 0 1,0-21-16,21 21 16,-21-21-16,21 20 0,0 1 15,-20-21 1,20 21-16,0 0 15,-21-21 1,21 21-16,-21 0 16,21 0-1,-21-21-15,21 21 16,-21 0-16,21 0 16,-21 0-16,0 0 15,21 0 1,0 0-16,0 0 31,-21-21-31,21 21 16,0 0-16,0 0 15,-21 0 17,21 0-17,0-1-15,-21-20 16,0 21-16,21 0 15,0 0 32,0 0-31</inkml:trace>
-  <inkml:trace contextRef="#ctx0" brushRef="#br0" timeOffset="498.23">188 3750 0,'21'0'16,"21"0"-1,-21 21-15,21-21 16,21 21-16,-21 0 16,-21-21-16,21 0 15,-21 0-15,-1 0 16,1 0-16,0 0 15,0 0-15,0 0 16,-21-21 62</inkml:trace>
+  <inkml:trace contextRef="#ctx0" brushRef="#br0" timeOffset="498.22">188 3750 0,'21'0'16,"21"0"-1,-21 21-15,21-21 16,21 21-16,-21 0 16,-21-21-16,21 0 15,-21 0-15,-1 0 16,1 0-16,0 0 15,0 0-15,0 0 16,-21-21 62</inkml:trace>
   <inkml:trace contextRef="#ctx0" brushRef="#br0" timeOffset="1673.16">817 3813 0,'-21'0'31,"0"0"-31,21 21 16,0 0 0,-21 0-1,21 0 1,0-1-1,-21-20-15,21 21 16,0 0 0,-21-21-16,21 21 15,0 0 1,0 0 15,21-21-15,0 21-16,21-21 15,0 0 1,-1 0-16,1-21 16,0 21-16,21-21 15,-63 0-15,21 21 16,-21-21-16,21 21 16,-21-21-16,0 0 15,0 1 1,0-1-1,0 0 1,0 0-16,-21 21 109,21 21-109,0 0 16,-21 0 0,21-1-16,-21 1 15,21 0-15,0 0 16,0 0 0,0 0-16,0 0 15,-21 0-15,21 0 16,0 0-1</inkml:trace>
   <inkml:trace contextRef="#ctx0" brushRef="#br0" timeOffset="2918.09">1152 3938 0,'0'21'62,"0"0"-46,0 0-1,0 0-15,0 0 32,0 0-17,21-21 235,-21-21-250,21 21 16,-21-21-16,21 0 15,-1 0 1,-20 0-16,21 0 16,-21 0-16,21 21 15,0-20-15,-21-1 16,21 21 0,-21-21-1,21 21 1,0 0 124,-21 21-140,21 20 16,-21-20-16,0 0 16,0 21-16,0-21 15,0 0-15,0 0 16,21-21 0,-21 21-16,0 0 15</inkml:trace>
   <inkml:trace contextRef="#ctx0" brushRef="#br0" timeOffset="4169.67">1801 3813 0,'-21'0'78,"-21"21"-62,21-21-1,0 21 1,0 0-16,0 0 16,0-21-16,21 20 15,-21-20-15,21 21 16,-21-21-16,21 21 15,0 0-15,0 0 47,0 0-15,0 0-17,0 0-15,21 0 16,0 0-1,0-21 1,-21 21 15,21-21-15,0 0 0,0 0 15,0 0-16,0 0 1,0 0 0</inkml:trace>
-  <inkml:trace contextRef="#ctx0" brushRef="#br0" timeOffset="4993.93">2010 3897 0,'-21'0'390,"0"0"-390</inkml:trace>
+  <inkml:trace contextRef="#ctx0" brushRef="#br0" timeOffset="4993.92">2010 3897 0,'-21'0'390,"0"0"-390</inkml:trace>
   <inkml:trace contextRef="#ctx0" brushRef="#br0" timeOffset="5840.5">1926 4106 0,'0'21'94,"21"-21"-47,0 0-16</inkml:trace>
   <inkml:trace contextRef="#ctx0" brushRef="#br0" timeOffset="8330.6">2366 3980 0,'21'0'47,"0"0"0,0 0-1,0 0-30,0-21 15,-21 0-15,0 0 0,0 1-1,0-1 1,0 0-1,0 0 1,0 0 0,0 0-1,-21 21-15,0-21 16,0 21 31,0 0-32,0 0 1,0 21 0,0-21-1,21 21-15,-21-21 16,21 21-16,-21 0 16,21 0-1,-20 0 1,20-1-1,0 1 1,0 0-16,0 0 16,0 0-1,20-21-15,-20 21 16,21 0-16,0 0 16,0 0-1,0 0 1,-21 0-1,21-21 17,0 0-17,0 0 1,0 0 0,0-21-1,0 21 1,0 0-1</inkml:trace>
   <inkml:trace contextRef="#ctx0" brushRef="#br0" timeOffset="9459.17">2743 3876 0,'-21'0'0,"0"0"32,21 21 14,0-1-30,0 1-16,0 0 16,21-21-16,0 21 31,0-21-15,0 0-1,0 0-15,21-21 16,-21 0-16,21 21 15,-21-21-15,0 1 16,-1-1 15,-40 21 63,20 21-94,-21-1 0,0 1 16,21 0-1,-21 0-15,0 21 0,0 0 16,0-21 0,0 0-1,21 0 1,-21 0-1,0 0 1,0 0 0,0 0-1,0 0 17,0-21-17,0 0 16,21-21-31,-21 0 16,0 0-16,21 0 16,0 0-1</inkml:trace>
@@ -360,7 +360,7 @@
   <inkml:trace contextRef="#ctx0" brushRef="#br0" timeOffset="19627.66">3895 4818 0,'21'0'32,"0"0"-17,0 0 1,0 0 0,0-21 15,-21 0-16,20 21-15,-20-21 16,0 1 0,0-1-1,-20 21 1,20-21-16,-21 21 16,0 0-1,0 0 1,0 0-1,0 0-15,0 0 16,0 21 0,21 0-1,-21-1 1,0 1 0,21 0-1,0 0 1,0 0-16,0 0 15,0 0 1,0 0 0,0 0-16,0 0 15,21-21-15,-21 21 16,21-21-16,0 0 31,0 0-15,0 0-16,0 0 15,0 0 17,0 0-1</inkml:trace>
   <inkml:trace contextRef="#ctx0" brushRef="#br0" timeOffset="20232.66">4272 4630 0,'0'42'63,"0"0"-48,-21-1-15,21 1 0,-21 0 16,0 21 0,21-42-16,0 0 15,0 0-15,0 0 16,0 0 0,0 0-1,-21-21 79,0 0-94</inkml:trace>
   <inkml:trace contextRef="#ctx0" brushRef="#br0" timeOffset="20701.18">4125 4881 0,'21'0'78,"0"0"-62,0 0-16,0 0 31</inkml:trace>
-  <inkml:trace contextRef="#ctx0" brushRef="#br0" timeOffset="22040.61">4481 4839 0,'0'21'78,"0"0"-63,0 0-15,-21-21 16,0 42-16,0-21 16,42-42 109,-21 0-110,21 0 1,-21 0 0,21 21-16,-21-21 15,21 21 1,-21-21-16,21 21 31,0 0-31,0 0 31,0 0 94</inkml:trace>
+  <inkml:trace contextRef="#ctx0" brushRef="#br0" timeOffset="22040.6">4481 4839 0,'0'21'78,"0"0"-63,0 0-15,-21-21 16,0 42-16,0-21 16,42-42 109,-21 0-110,21 0 1,-21 0 0,21 21-16,-21-21 15,21 21 1,-21-21-16,21 21 31,0 0-31,0 0 31,0 0 94</inkml:trace>
   <inkml:trace contextRef="#ctx0" brushRef="#br0" timeOffset="23049.97">4795 4944 0,'0'-21'16,"-21"21"15,0 0-16,0 0 1,0 0 0,1 21-1,-1 0 1,21 0 15,0 0 0,0 0-15,0 0-16,21-21 16,-1 21-1,1-21 1,0 0 0,0 0-1,0 0-15,0 0 16,-21-21-1,21 0-15,-21 0 32,0 42 108,0 0-140,-21 0 16,0 0 0,21 0-16,-21 20 15,21-20-15,-21 0 16,0 0-16,21 0 15,0 0 1,-21-21-16,21 21 16,-20-21 15,-1 0-15,0 0-1,0 21 1,0-21-1,0 0 1,0 0-16</inkml:trace>
   <inkml:trace contextRef="#ctx0" brushRef="#br0" timeOffset="29407.73">5444 4399 0,'21'0'15,"0"0"1,21 0 0,0 0-1,21 0-15,0 0 16,-1 0-16,1 0 15,0 0-15,0 0 16,0 0-16,-21 0 16,-21 0-16,-1 0 15,22 0-15,-21 0 16,0 0 0,0 0-1,0 0 1,0 0-1,0 0-15,0 0 16,21 0 0,0 0-16,-21 0 15,21 0-15,-22 0 16,1 0-16,0 0 16,0 0-16,0 0 15,0-21 1,21 21-16,-21 0 15,0 0-15,0 0 16,-21-21-16,42 21 16,0-21-16,-21 21 15,0 0-15,41-20 16,-20 20-16,0 0 16,0-21-16,21 21 15,-21 0-15,0 0 16,20 0-16,-20 0 15,-21 0-15,0 0 16,0 0-16,0 0 16,0 0-16,21 0 15,21 0-15,-21 0 16,-1 0-16,1 0 16,0 0-16,0 0 15,0 0-15,21 0 16,-21 0-16,-1 0 15,1 0-15,0 21 16,0-21-16,21 20 16,-21-20-16,0 0 15,0 0-15,-1 0 16,1 0-16,0 0 16,0 0-16,-21 0 15,21 0-15,-21 0 16,21 0-16,-21 0 15,0 0-15,0 0 16,20 0-16,-20 0 16,0 0-16,21 0 15,0 0-15,0 0 16,-21 0-16,21 0 16,0 0-16,20 0 15,-20 0-15,0 21 16,0-21-16,-21 21 15,42-21-15,-21 21 16,0-21-16,0 21 16,20 0-16,-20-21 15,21 21-15,-21-21 16,21 21-16,0 0 0,-1-21 16,1 0-1,0 0-15,0 21 16,0-21-16,-21 0 15,-1 0-15,1 0 16,21 0-16,-21 21 16,-21-21-16,21 0 0,-21 0 15,42 0 1,-42 21-16,20-21 16,1 0-16,0 0 15,-21 0-15,0 21 0,0 0 16,21-21-16,-21 0 15,21 0 1,-21 0 0,-21 21-16,21-21 15,-1 0-15,1 0 16,0 0 0,0 0-16,0 0 15,0 0 1,0 0-16,21 0 0,-21 0 15,0 0-15,0 0 16,0 0 0,0 0-1,0 0 1,0 0-16,20 0 16,-20 0-1,0 0 1,0 0-16,0 0 15,42 0-15,-42 0 0,21 0 16,0 0-16,-21 0 16,0 0-16,0 0 15,0 0-15,20 0 16,-20 0-16,0 0 16,0 0-16,21 0 15,-21 0-15,0 0 16,21 0-16,-21 0 15,21 0 1,-21 0 0,20 0-1,1 0-15,0 0 16,-21 0-16,21 0 16,-21 0-1,0 0 1,0 0-1,0 0-15,0 0 16,0 0 0,21 0-1,-21 0 1,-1 0 0,22 0-16,-21-21 15,21 21-15,-21-21 16,0 21-16,0 0 15,21 0-15,0-21 16,-21 21-16,21 0 16,-22 0-1,1 0 17,0 0-1,0 0-16,0-21 1,0 21 0,0 0-1,0 0 32,-21 21 109,0 0-156,0 21 16,0 0-16,0 0 16,0-1-16,0 1 15,0-21-15,0 21 16,0 0-16,0-21 16,0 42-1,0-42-15,0 21 16,-21-21-1,21 0-15,0 0 16,0 0-16,0-1 16,0 1-1,0 0 1,0 0 0,0 21-1,0-21 1,0 0-1,0 0 1,-21 0 0,0 0-1,21 0 1,-21 0 0,21 0-16,0 0 15,0 0 1,0 0-16,-21-21 15,21 21-15,0 0 16,0 0 0,0-1-1,0 1 1,0 0-16,0 0 16,0 0-16,0 0 15,0 0-15,0 0 16,0 0-1,0 21 1,0-21-16,0 21 16,0-21-1,0 0-15,0 0 16,0 0 0,0 0-16,0 0 15,0 20 1,0-20-16,0 0 15,0 21-15,0 0 16,0-21-16,0 21 16,0 0-1,0-21 1,0 0-16,0 0 0,0 0 16,0 0-1,0 0-15,0 41 16,0-41-16,0 0 0,0 21 15,0 0 1,0-21-16,0 0 16,21 0-1,-21 0-15,0 0 0,21 0 16,0 0-16,-21 21 31,21-42-31,-21 21 16,0 0-16,21 20 15,0 1-15,-21-21 16,21 21-16,-21-21 16,21 0-16,-21 0 15,0 0 1,21 21-16,-21-21 16,21 21-16,-21-21 0,0 0 15,0 21-15,0-22 16,21 22-16,-21 0 15,21 0 1,-21 0-16,0 0 0,21 0 16,-21 0-16,0 21 15,0-21-15,0-1 16,0-20 0,0 0-16,0 21 0,0 0 15,0 0-15,0 0 16,0 0-1,21 0-15,-21 21 0,0-42 16,20 20-16,-20-20 16,0 0-16,0 0 15,21 0-15,-21 42 16,0-42 0,0 0-16,0 0 15,0 0-15,0 21 16,0 0-16,0 0 15,0-1-15,0-20 16,-21 42-16,21-42 16,0 0-16,0 0 15,0 0-15,0 0 16,-20 21-16,-1-21 16,21 0-16,-21 21 15,21-21-15,0 0 16,0 20-16,0-20 15,-21-21 1,21 21-16,0 0 16,0 0-1,-21 0 1,21 0-16,0 21 16,0-21-1,0 0 1,0 0-1,0 0 1,0 0 0,0 0-1,0 0-15,0 0 16,0 0 0,0 0-16,0 0 15,0-1 1,0 1-1,0 0-15,0 0 16,0 0 0,0 0-1,0 0-15,0 0 32,0 0 46,0 0-63,0 0 1,0 0 0,0 0-1,0 0-15,0 0 16,0 0-16,-21 21 15,21-21-15,0 0 16,-21-1 0,21 1-16,0 0 15,0 0 1,0 0 15,0 0 63,0 0 156</inkml:trace>
   <inkml:trace contextRef="#ctx0" brushRef="#br0" timeOffset="33368.48">5465 9888 0,'21'0'16,"0"0"-1,0 0-15,21 0 16,0 0 0,21 0-16,0 0 15,-1 0-15,-20 0 16,21-21-16,0 0 0,-21 21 15,0 0 1,-1-21-16,1 0 16,21 21-16,-21 0 15,0 0-15,0 0 16,0 0-16,0 0 16,-1 0-16,1 0 15,0 0-15,0 0 16,-21 0-16,21 0 15,-21 0-15,0 0 0,21 0 16,0 0 0,-1 0-16,1 0 0,-21 0 15,0 21 1,42-21-16,-42 0 16,-21 21-16,42-21 0,0 0 15,-21 0 16,0 0-31,0 21 0,-1 0 16,1-21 0,0 0-16,21 21 0,-21 0 15,0-21-15,21 0 16,-42 21 0,21-21-16,0 21 0,21-21 15,-21 0-15,21 21 16,-1-21-16,1 21 15,21-21-15,-21 21 16,0 0-16,0 0 16,0-21-16,0 0 15,20 0-15,-20 0 16,-21 0-16,0 0 16,21 0-1,-42 21-15,21-21 0,21 0 16,0 21-16,0-21 15,-1 0-15,22 0 16,0 0-16,-21 0 16,0 0-16,21 0 15,-21 0-15,20 0 16,-20 0-16,0 0 16,0 0-16,0-21 15,0 21-15,-21-21 16,0 21-1,21 0-15,20-21 0,-20 0 16,-21 21-16,21 0 16,0-21-16,21 0 15,-21 0-15,0 21 16,-1 0-16,1-21 16,-21 0-1,0 21-15,0 0 16,21 0-16,-21 0 15,0-21-15,0 0 16,21 21-16,-21 0 16,0-21-16,20 21 15,22-21-15,-21 21 16,0 0-16,0 0 16,-21 0-16,42 0 15,-42 0-15,0 0 16,-1 0-16,-20-21 15,21 21-15,21 0 16,0 0 0,-21 0-16,21 0 15,-21 0-15,21 0 16,-21 0-16,0 0 16,21 0-16,-21 21 15,20-21 1,-41 21-16,21-21 15,0 0-15,0 21 16,0-21-16,0 0 16,0 0-16,21 21 15,0 0-15,-21-21 16,21 21-16,-1-21 16,-20 0-16,21 21 15,-21-21-15,21 21 16,0-21-16,-21 0 15,0 0-15,0 0 16,0 0-16,0 0 16,0 0-1,0 0-15,0 0 16,-1 0-16,1 0 16,21 0-16,-21 0 15,0 0-15,0 0 16,0 0-16,0 0 15,21 0-15,-21 0 16,21 0 0,-21 0-16,0 0 15,0 0-15,-1 0 16,1 0-16,21 0 16,0-21-16,-21 21 15,21-21-15,0 21 16,0 0-16,0 0 15,-1 0-15,1 0 16,0 0-16,0 0 16,-21 0-16,0 0 15,0 0-15,0 0 16,0 0-16,0 0 16,0 0-1,0 0-15,0 0 16,0-21-16,-1 21 15,1 0-15,0 0 16,0 0 0,0 0-16,0 0 15,21 0 1,-21 0 0,0 0-16,0 0 15,0 0 141,21 0-140,-21 0 0,0 0-16,-1 0 15,1 0 17,0 0 171,0 0-188,0 0-15,0 0 16,0 0-16,-42 0 156</inkml:trace>
@@ -516,7 +516,7 @@
           <a:p>
             <a:fld id="{90BC4B87-6123-4AD5-BA18-D0C615F32DE0}" type="datetimeFigureOut">
               <a:rPr lang="de-DE" smtClean="0"/>
-              <a:t>15.10.2021</a:t>
+              <a:t>25.10.2021</a:t>
             </a:fld>
             <a:endParaRPr lang="de-DE"/>
           </a:p>
@@ -1504,7 +1504,7 @@
           <a:p>
             <a:fld id="{11D9FFB6-471B-4F83-9ECD-BBA79A321517}" type="datetime1">
               <a:rPr lang="de-DE" smtClean="0"/>
-              <a:t>15.10.2021</a:t>
+              <a:t>25.10.2021</a:t>
             </a:fld>
             <a:endParaRPr lang="de-DE" dirty="0"/>
           </a:p>
@@ -1762,7 +1762,7 @@
           <a:p>
             <a:fld id="{2B4375A3-45FE-4B2E-AA3B-7AAF8589442B}" type="datetime1">
               <a:rPr lang="de-DE" smtClean="0"/>
-              <a:t>15.10.2021</a:t>
+              <a:t>25.10.2021</a:t>
             </a:fld>
             <a:endParaRPr lang="de-DE" dirty="0"/>
           </a:p>
@@ -1888,7 +1888,7 @@
           <a:p>
             <a:fld id="{61778C41-F323-4B1D-B5A5-A93AB73839E4}" type="datetime1">
               <a:rPr lang="de-DE" smtClean="0"/>
-              <a:t>15.10.2021</a:t>
+              <a:t>25.10.2021</a:t>
             </a:fld>
             <a:endParaRPr lang="de-DE" dirty="0"/>
           </a:p>
@@ -2054,7 +2054,7 @@
           <a:p>
             <a:fld id="{F819A776-5147-4A2F-8CFD-8274A295B3D8}" type="datetime1">
               <a:rPr lang="de-DE" smtClean="0"/>
-              <a:t>15.10.2021</a:t>
+              <a:t>25.10.2021</a:t>
             </a:fld>
             <a:endParaRPr lang="de-DE" dirty="0"/>
           </a:p>
@@ -2240,7 +2240,7 @@
           <a:p>
             <a:fld id="{C540E49B-B052-4B2B-8ADA-D7994E16CB7E}" type="datetime1">
               <a:rPr lang="de-DE" smtClean="0"/>
-              <a:t>15.10.2021</a:t>
+              <a:t>25.10.2021</a:t>
             </a:fld>
             <a:endParaRPr lang="de-DE" dirty="0"/>
           </a:p>
@@ -2405,7 +2405,7 @@
           <a:p>
             <a:fld id="{A2A4CFAB-1AC1-48B0-ADA6-B021DEBF5E6B}" type="datetime1">
               <a:rPr lang="de-DE" smtClean="0"/>
-              <a:t>15.10.2021</a:t>
+              <a:t>25.10.2021</a:t>
             </a:fld>
             <a:endParaRPr lang="de-DE" dirty="0"/>
           </a:p>
@@ -2669,7 +2669,7 @@
           <a:p>
             <a:fld id="{177BDD56-7E62-4E4F-86C4-E8B186AB0D8F}" type="datetime1">
               <a:rPr lang="de-DE" smtClean="0"/>
-              <a:t>15.10.2021</a:t>
+              <a:t>25.10.2021</a:t>
             </a:fld>
             <a:endParaRPr lang="de-DE" dirty="0"/>
           </a:p>
@@ -2992,7 +2992,7 @@
           <a:p>
             <a:fld id="{E8C60618-031C-4401-8F3A-70ECBBC7F293}" type="datetime1">
               <a:rPr lang="de-DE" smtClean="0"/>
-              <a:t>15.10.2021</a:t>
+              <a:t>25.10.2021</a:t>
             </a:fld>
             <a:endParaRPr lang="de-DE" dirty="0"/>
           </a:p>
@@ -3315,7 +3315,7 @@
           <a:p>
             <a:fld id="{7F72592A-160D-44CB-954D-9B41AC9FA5C6}" type="datetime1">
               <a:rPr lang="de-DE" smtClean="0"/>
-              <a:t>15.10.2021</a:t>
+              <a:t>25.10.2021</a:t>
             </a:fld>
             <a:endParaRPr lang="de-DE" dirty="0"/>
           </a:p>
@@ -3607,7 +3607,7 @@
           <a:p>
             <a:fld id="{E08E832B-FBEA-4D59-83F9-5646C01B29AB}" type="datetime1">
               <a:rPr lang="de-DE" smtClean="0"/>
-              <a:t>15.10.2021</a:t>
+              <a:t>25.10.2021</a:t>
             </a:fld>
             <a:endParaRPr lang="de-DE" dirty="0"/>
           </a:p>
@@ -3853,7 +3853,7 @@
           <a:p>
             <a:fld id="{C1D20DD9-DC1A-48DE-9A59-99E4A6374E67}" type="datetime1">
               <a:rPr lang="de-DE" smtClean="0"/>
-              <a:t>15.10.2021</a:t>
+              <a:t>25.10.2021</a:t>
             </a:fld>
             <a:endParaRPr lang="de-DE" dirty="0"/>
           </a:p>
@@ -4284,7 +4284,7 @@
           <a:p>
             <a:fld id="{AC9C1A0D-2DE5-42AF-9C81-E67327D25E5B}" type="datetime1">
               <a:rPr lang="de-DE" smtClean="0"/>
-              <a:t>15.10.2021</a:t>
+              <a:t>25.10.2021</a:t>
             </a:fld>
             <a:endParaRPr lang="de-DE" dirty="0"/>
           </a:p>
@@ -4491,7 +4491,7 @@
           <a:p>
             <a:fld id="{D32FFC7E-D9EA-4B31-BA0A-B1F75013F5C5}" type="datetime1">
               <a:rPr lang="de-DE" smtClean="0"/>
-              <a:t>15.10.2021</a:t>
+              <a:t>25.10.2021</a:t>
             </a:fld>
             <a:endParaRPr lang="de-DE" dirty="0"/>
           </a:p>
@@ -4824,7 +4824,7 @@
           <a:p>
             <a:fld id="{41BB804A-FCB4-4BD1-8985-BDA23DC16A73}" type="datetime1">
               <a:rPr lang="de-DE" smtClean="0"/>
-              <a:t>15.10.2021</a:t>
+              <a:t>25.10.2021</a:t>
             </a:fld>
             <a:endParaRPr lang="de-DE" dirty="0"/>
           </a:p>
@@ -5316,7 +5316,7 @@
           <a:p>
             <a:fld id="{E589149D-A132-4D7B-B9EE-FB37C09D0D97}" type="datetime1">
               <a:rPr lang="de-DE" smtClean="0"/>
-              <a:t>15.10.2021</a:t>
+              <a:t>25.10.2021</a:t>
             </a:fld>
             <a:endParaRPr lang="de-DE" dirty="0"/>
           </a:p>
@@ -5954,7 +5954,7 @@
           <a:p>
             <a:fld id="{4E82B31A-3B5A-4299-9C54-A72D27A406C9}" type="datetime1">
               <a:rPr lang="de-DE" smtClean="0"/>
-              <a:t>15.10.2021</a:t>
+              <a:t>25.10.2021</a:t>
             </a:fld>
             <a:endParaRPr lang="de-DE" dirty="0"/>
           </a:p>
@@ -6264,7 +6264,7 @@
           <a:p>
             <a:fld id="{45843081-6169-4278-BDDA-35157F5D3692}" type="datetime1">
               <a:rPr lang="de-DE" smtClean="0"/>
-              <a:t>15.10.2021</a:t>
+              <a:t>25.10.2021</a:t>
             </a:fld>
             <a:endParaRPr lang="de-DE" dirty="0"/>
           </a:p>
@@ -6683,7 +6683,7 @@
           <a:p>
             <a:fld id="{8F70348D-64E4-4B82-B16D-4CD18B9DA606}" type="datetime1">
               <a:rPr lang="de-DE" smtClean="0"/>
-              <a:t>15.10.2021</a:t>
+              <a:t>25.10.2021</a:t>
             </a:fld>
             <a:endParaRPr lang="de-DE" dirty="0"/>
           </a:p>
@@ -7408,7 +7408,7 @@
           <a:p>
             <a:fld id="{F61EABF9-6F9B-48B2-B3B5-F1E3A1DF8B67}" type="datetime1">
               <a:rPr lang="de-DE" smtClean="0"/>
-              <a:t>15.10.2021</a:t>
+              <a:t>25.10.2021</a:t>
             </a:fld>
             <a:endParaRPr lang="de-DE" dirty="0"/>
           </a:p>
@@ -7647,7 +7647,7 @@
           <a:p>
             <a:fld id="{F9370870-AF2F-4892-BDF8-7CA6CC836611}" type="datetime1">
               <a:rPr lang="de-DE" smtClean="0"/>
-              <a:t>15.10.2021</a:t>
+              <a:t>25.10.2021</a:t>
             </a:fld>
             <a:endParaRPr lang="de-DE" dirty="0"/>
           </a:p>
@@ -8202,7 +8202,7 @@
           <a:p>
             <a:fld id="{7DF24AFE-4552-4E1E-B762-BCD07C4E7DD2}" type="datetime1">
               <a:rPr lang="de-DE" smtClean="0"/>
-              <a:t>15.10.2021</a:t>
+              <a:t>25.10.2021</a:t>
             </a:fld>
             <a:endParaRPr lang="de-DE" dirty="0"/>
           </a:p>
@@ -9279,8 +9279,8 @@
         </p:nvSpPr>
         <p:spPr>
           <a:xfrm>
-            <a:off x="2027220" y="3212360"/>
-            <a:ext cx="1224136" cy="215444"/>
+            <a:off x="2015635" y="3114290"/>
+            <a:ext cx="1224136" cy="338554"/>
           </a:xfrm>
           <a:prstGeom prst="rect">
             <a:avLst/>
@@ -9299,7 +9299,15 @@
             </a:r>
             <a:r>
               <a:rPr lang="de-DE" sz="800" dirty="0" err="1"/>
-              <a:t>asymmetry</a:t>
+              <a:t>min_asymm</a:t>
+            </a:r>
+            <a:r>
+              <a:rPr lang="de-DE" sz="800" dirty="0"/>
+              <a:t>, </a:t>
+            </a:r>
+            <a:r>
+              <a:rPr lang="de-DE" sz="800" dirty="0" err="1"/>
+              <a:t>asymm</a:t>
             </a:r>
             <a:r>
               <a:rPr lang="de-DE" sz="800" dirty="0"/>
@@ -9322,8 +9330,8 @@
         </p:nvSpPr>
         <p:spPr>
           <a:xfrm>
-            <a:off x="3285193" y="3212360"/>
-            <a:ext cx="1255136" cy="215444"/>
+            <a:off x="3297988" y="3113625"/>
+            <a:ext cx="1255136" cy="338554"/>
           </a:xfrm>
           <a:prstGeom prst="rect">
             <a:avLst/>
@@ -9338,70 +9346,19 @@
           <a:p>
             <a:r>
               <a:rPr lang="de-DE" sz="800" dirty="0"/>
-              <a:t>[normal, </a:t>
+              <a:t>[</a:t>
+            </a:r>
+            <a:r>
+              <a:rPr lang="de-DE" sz="800" dirty="0" err="1"/>
+              <a:t>complete</a:t>
+            </a:r>
+            <a:r>
+              <a:rPr lang="de-DE" sz="800" dirty="0"/>
+              <a:t>, </a:t>
             </a:r>
             <a:r>
               <a:rPr lang="de-DE" sz="800" dirty="0" err="1"/>
               <a:t>incomplete</a:t>
-            </a:r>
-            <a:r>
-              <a:rPr lang="de-DE" sz="800" dirty="0"/>
-              <a:t>]</a:t>
-            </a:r>
-          </a:p>
-        </p:txBody>
-      </p:sp>
-      <p:sp>
-        <p:nvSpPr>
-          <p:cNvPr id="68" name="Textfeld 67">
-            <a:extLst>
-              <a:ext uri="{FF2B5EF4-FFF2-40B4-BE49-F238E27FC236}">
-                <a16:creationId xmlns:a16="http://schemas.microsoft.com/office/drawing/2014/main" id="{DACB2432-A6D0-434D-8FEB-03F924B146B8}"/>
-              </a:ext>
-            </a:extLst>
-          </p:cNvPr>
-          <p:cNvSpPr txBox="1"/>
-          <p:nvPr/>
-        </p:nvSpPr>
-        <p:spPr>
-          <a:xfrm>
-            <a:off x="5877901" y="3068121"/>
-            <a:ext cx="991208" cy="338554"/>
-          </a:xfrm>
-          <a:prstGeom prst="rect">
-            <a:avLst/>
-          </a:prstGeom>
-          <a:noFill/>
-        </p:spPr>
-        <p:txBody>
-          <a:bodyPr wrap="square" rtlCol="0">
-            <a:spAutoFit/>
-          </a:bodyPr>
-          <a:lstStyle/>
-          <a:p>
-            <a:r>
-              <a:rPr lang="de-DE" sz="800" dirty="0"/>
-              <a:t>[normal, </a:t>
-            </a:r>
-            <a:r>
-              <a:rPr lang="de-DE" sz="800" dirty="0" err="1"/>
-              <a:t>slightly</a:t>
-            </a:r>
-            <a:r>
-              <a:rPr lang="de-DE" sz="800" dirty="0"/>
-              <a:t> </a:t>
-            </a:r>
-            <a:r>
-              <a:rPr lang="de-DE" sz="800" dirty="0" err="1"/>
-              <a:t>asymm</a:t>
-            </a:r>
-            <a:r>
-              <a:rPr lang="de-DE" sz="800" dirty="0"/>
-              <a:t>, </a:t>
-            </a:r>
-            <a:r>
-              <a:rPr lang="de-DE" sz="800" dirty="0" err="1"/>
-              <a:t>asymm</a:t>
             </a:r>
             <a:r>
               <a:rPr lang="de-DE" sz="800" dirty="0"/>
@@ -9459,7 +9416,7 @@
         </p:nvSpPr>
         <p:spPr>
           <a:xfrm>
-            <a:off x="4652460" y="3060204"/>
+            <a:off x="4581476" y="3071765"/>
             <a:ext cx="1224133" cy="338554"/>
           </a:xfrm>
           <a:prstGeom prst="rect">
@@ -9479,15 +9436,7 @@
             </a:r>
             <a:r>
               <a:rPr lang="de-DE" sz="800" dirty="0" err="1"/>
-              <a:t>slightly</a:t>
-            </a:r>
-            <a:r>
-              <a:rPr lang="de-DE" sz="800" dirty="0"/>
-              <a:t> </a:t>
-            </a:r>
-            <a:r>
-              <a:rPr lang="de-DE" sz="800" dirty="0" err="1"/>
-              <a:t>asymm</a:t>
+              <a:t>min_asymm</a:t>
             </a:r>
             <a:r>
               <a:rPr lang="de-DE" sz="800" dirty="0"/>
@@ -9659,6 +9608,57 @@
             <a:r>
               <a:rPr lang="de-DE" sz="800" dirty="0"/>
               <a:t>Scores nach House Brackmann</a:t>
+            </a:r>
+          </a:p>
+        </p:txBody>
+      </p:sp>
+      <p:sp>
+        <p:nvSpPr>
+          <p:cNvPr id="36" name="Textfeld 35">
+            <a:extLst>
+              <a:ext uri="{FF2B5EF4-FFF2-40B4-BE49-F238E27FC236}">
+                <a16:creationId xmlns:a16="http://schemas.microsoft.com/office/drawing/2014/main" id="{A603FBF6-E78A-46CA-AF84-CE9DA5DB25B4}"/>
+              </a:ext>
+            </a:extLst>
+          </p:cNvPr>
+          <p:cNvSpPr txBox="1"/>
+          <p:nvPr/>
+        </p:nvSpPr>
+        <p:spPr>
+          <a:xfrm>
+            <a:off x="5816650" y="3120396"/>
+            <a:ext cx="1224133" cy="338554"/>
+          </a:xfrm>
+          <a:prstGeom prst="rect">
+            <a:avLst/>
+          </a:prstGeom>
+          <a:noFill/>
+        </p:spPr>
+        <p:txBody>
+          <a:bodyPr wrap="square" rtlCol="0">
+            <a:spAutoFit/>
+          </a:bodyPr>
+          <a:lstStyle/>
+          <a:p>
+            <a:r>
+              <a:rPr lang="de-DE" sz="800" dirty="0"/>
+              <a:t>[normal, </a:t>
+            </a:r>
+            <a:r>
+              <a:rPr lang="de-DE" sz="800" dirty="0" err="1"/>
+              <a:t>min_asymm</a:t>
+            </a:r>
+            <a:r>
+              <a:rPr lang="de-DE" sz="800" dirty="0"/>
+              <a:t>, </a:t>
+            </a:r>
+            <a:r>
+              <a:rPr lang="de-DE" sz="800" dirty="0" err="1"/>
+              <a:t>asymm</a:t>
+            </a:r>
+            <a:r>
+              <a:rPr lang="de-DE" sz="800" dirty="0"/>
+              <a:t>]</a:t>
             </a:r>
           </a:p>
         </p:txBody>
@@ -9743,7 +9743,7 @@
           <a:p>
             <a:fld id="{7DF24AFE-4552-4E1E-B762-BCD07C4E7DD2}" type="datetime1">
               <a:rPr lang="de-DE" smtClean="0"/>
-              <a:t>15.10.2021</a:t>
+              <a:t>25.10.2021</a:t>
             </a:fld>
             <a:endParaRPr lang="de-DE" dirty="0"/>
           </a:p>
@@ -10808,151 +10808,6 @@
       </p:cxnSp>
       <p:sp>
         <p:nvSpPr>
-          <p:cNvPr id="65" name="Textfeld 64">
-            <a:extLst>
-              <a:ext uri="{FF2B5EF4-FFF2-40B4-BE49-F238E27FC236}">
-                <a16:creationId xmlns:a16="http://schemas.microsoft.com/office/drawing/2014/main" id="{8D7E0B8B-61A0-4DE2-8F89-E8435435480B}"/>
-              </a:ext>
-            </a:extLst>
-          </p:cNvPr>
-          <p:cNvSpPr txBox="1"/>
-          <p:nvPr/>
-        </p:nvSpPr>
-        <p:spPr>
-          <a:xfrm>
-            <a:off x="2027220" y="3212360"/>
-            <a:ext cx="1224136" cy="215444"/>
-          </a:xfrm>
-          <a:prstGeom prst="rect">
-            <a:avLst/>
-          </a:prstGeom>
-          <a:noFill/>
-        </p:spPr>
-        <p:txBody>
-          <a:bodyPr wrap="square" rtlCol="0">
-            <a:spAutoFit/>
-          </a:bodyPr>
-          <a:lstStyle/>
-          <a:p>
-            <a:r>
-              <a:rPr lang="de-DE" sz="800" dirty="0"/>
-              <a:t>[normal, </a:t>
-            </a:r>
-            <a:r>
-              <a:rPr lang="de-DE" sz="800" dirty="0" err="1"/>
-              <a:t>asymmetry</a:t>
-            </a:r>
-            <a:r>
-              <a:rPr lang="de-DE" sz="800" dirty="0"/>
-              <a:t>]</a:t>
-            </a:r>
-          </a:p>
-        </p:txBody>
-      </p:sp>
-      <p:sp>
-        <p:nvSpPr>
-          <p:cNvPr id="66" name="Textfeld 65">
-            <a:extLst>
-              <a:ext uri="{FF2B5EF4-FFF2-40B4-BE49-F238E27FC236}">
-                <a16:creationId xmlns:a16="http://schemas.microsoft.com/office/drawing/2014/main" id="{58A8630E-C59A-4C0C-956F-948E3F5FC72B}"/>
-              </a:ext>
-            </a:extLst>
-          </p:cNvPr>
-          <p:cNvSpPr txBox="1"/>
-          <p:nvPr/>
-        </p:nvSpPr>
-        <p:spPr>
-          <a:xfrm>
-            <a:off x="3285193" y="3212360"/>
-            <a:ext cx="1255136" cy="215444"/>
-          </a:xfrm>
-          <a:prstGeom prst="rect">
-            <a:avLst/>
-          </a:prstGeom>
-          <a:noFill/>
-        </p:spPr>
-        <p:txBody>
-          <a:bodyPr wrap="square" rtlCol="0">
-            <a:spAutoFit/>
-          </a:bodyPr>
-          <a:lstStyle/>
-          <a:p>
-            <a:r>
-              <a:rPr lang="de-DE" sz="800" dirty="0"/>
-              <a:t>[normal, </a:t>
-            </a:r>
-            <a:r>
-              <a:rPr lang="de-DE" sz="800" dirty="0" err="1"/>
-              <a:t>incomplete</a:t>
-            </a:r>
-            <a:r>
-              <a:rPr lang="de-DE" sz="800" dirty="0"/>
-              <a:t>]</a:t>
-            </a:r>
-          </a:p>
-        </p:txBody>
-      </p:sp>
-      <p:sp>
-        <p:nvSpPr>
-          <p:cNvPr id="68" name="Textfeld 67">
-            <a:extLst>
-              <a:ext uri="{FF2B5EF4-FFF2-40B4-BE49-F238E27FC236}">
-                <a16:creationId xmlns:a16="http://schemas.microsoft.com/office/drawing/2014/main" id="{DACB2432-A6D0-434D-8FEB-03F924B146B8}"/>
-              </a:ext>
-            </a:extLst>
-          </p:cNvPr>
-          <p:cNvSpPr txBox="1"/>
-          <p:nvPr/>
-        </p:nvSpPr>
-        <p:spPr>
-          <a:xfrm>
-            <a:off x="5877901" y="3068121"/>
-            <a:ext cx="991208" cy="338554"/>
-          </a:xfrm>
-          <a:prstGeom prst="rect">
-            <a:avLst/>
-          </a:prstGeom>
-          <a:noFill/>
-        </p:spPr>
-        <p:txBody>
-          <a:bodyPr wrap="square" rtlCol="0">
-            <a:spAutoFit/>
-          </a:bodyPr>
-          <a:lstStyle/>
-          <a:p>
-            <a:r>
-              <a:rPr lang="de-DE" sz="800" dirty="0"/>
-              <a:t>[normal, </a:t>
-            </a:r>
-            <a:r>
-              <a:rPr lang="de-DE" sz="800" dirty="0" err="1"/>
-              <a:t>slightly</a:t>
-            </a:r>
-            <a:r>
-              <a:rPr lang="de-DE" sz="800" dirty="0"/>
-              <a:t> </a:t>
-            </a:r>
-            <a:r>
-              <a:rPr lang="de-DE" sz="800" dirty="0" err="1"/>
-              <a:t>asymm</a:t>
-            </a:r>
-            <a:r>
-              <a:rPr lang="de-DE" sz="800" dirty="0"/>
-              <a:t>, </a:t>
-            </a:r>
-            <a:r>
-              <a:rPr lang="de-DE" sz="800" dirty="0" err="1"/>
-              <a:t>asymm</a:t>
-            </a:r>
-            <a:r>
-              <a:rPr lang="de-DE" sz="800" dirty="0"/>
-              <a:t>]</a:t>
-            </a:r>
-          </a:p>
-        </p:txBody>
-      </p:sp>
-      <p:sp>
-        <p:nvSpPr>
           <p:cNvPr id="69" name="Textfeld 68">
             <a:extLst>
               <a:ext uri="{FF2B5EF4-FFF2-40B4-BE49-F238E27FC236}">
@@ -10982,65 +10837,6 @@
             <a:r>
               <a:rPr lang="de-DE" sz="800" dirty="0"/>
               <a:t>[I, II III, IV, V, VI]</a:t>
-            </a:r>
-          </a:p>
-        </p:txBody>
-      </p:sp>
-      <p:sp>
-        <p:nvSpPr>
-          <p:cNvPr id="70" name="Textfeld 69">
-            <a:extLst>
-              <a:ext uri="{FF2B5EF4-FFF2-40B4-BE49-F238E27FC236}">
-                <a16:creationId xmlns:a16="http://schemas.microsoft.com/office/drawing/2014/main" id="{49EFAFF3-CDEC-4874-8DF0-A46C58E2D141}"/>
-              </a:ext>
-            </a:extLst>
-          </p:cNvPr>
-          <p:cNvSpPr txBox="1"/>
-          <p:nvPr/>
-        </p:nvSpPr>
-        <p:spPr>
-          <a:xfrm>
-            <a:off x="4652460" y="3060204"/>
-            <a:ext cx="1224133" cy="338554"/>
-          </a:xfrm>
-          <a:prstGeom prst="rect">
-            <a:avLst/>
-          </a:prstGeom>
-          <a:noFill/>
-        </p:spPr>
-        <p:txBody>
-          <a:bodyPr wrap="square" rtlCol="0">
-            <a:spAutoFit/>
-          </a:bodyPr>
-          <a:lstStyle/>
-          <a:p>
-            <a:r>
-              <a:rPr lang="de-DE" sz="800" dirty="0"/>
-              <a:t>[normal, </a:t>
-            </a:r>
-            <a:r>
-              <a:rPr lang="de-DE" sz="800" dirty="0" err="1"/>
-              <a:t>slightly</a:t>
-            </a:r>
-            <a:r>
-              <a:rPr lang="de-DE" sz="800" dirty="0"/>
-              <a:t> </a:t>
-            </a:r>
-            <a:r>
-              <a:rPr lang="de-DE" sz="800" dirty="0" err="1"/>
-              <a:t>asymm</a:t>
-            </a:r>
-            <a:r>
-              <a:rPr lang="de-DE" sz="800" dirty="0"/>
-              <a:t>, </a:t>
-            </a:r>
-            <a:r>
-              <a:rPr lang="de-DE" sz="800" dirty="0" err="1"/>
-              <a:t>asymm</a:t>
-            </a:r>
-            <a:r>
-              <a:rPr lang="de-DE" sz="800" dirty="0"/>
-              <a:t>]</a:t>
             </a:r>
           </a:p>
         </p:txBody>
@@ -11219,7 +11015,7 @@
               <p14:nvPr/>
             </p14:nvContentPartPr>
             <p14:xfrm>
-              <a:off x="67680" y="1214280"/>
+              <a:off x="102576" y="1218852"/>
               <a:ext cx="7493760" cy="3168000"/>
             </p14:xfrm>
           </p:contentPart>
@@ -11245,7 +11041,7 @@
             </p:blipFill>
             <p:spPr>
               <a:xfrm>
-                <a:off x="58320" y="1204920"/>
+                <a:off x="93216" y="1209492"/>
                 <a:ext cx="7512480" cy="3186720"/>
               </a:xfrm>
               <a:prstGeom prst="rect">
@@ -11300,6 +11096,210 @@
             <a:r>
               <a:rPr lang="de-DE" sz="800" dirty="0"/>
               <a:t> wird so nicht angewendet.</a:t>
+            </a:r>
+          </a:p>
+        </p:txBody>
+      </p:sp>
+      <p:sp>
+        <p:nvSpPr>
+          <p:cNvPr id="38" name="Textfeld 37">
+            <a:extLst>
+              <a:ext uri="{FF2B5EF4-FFF2-40B4-BE49-F238E27FC236}">
+                <a16:creationId xmlns:a16="http://schemas.microsoft.com/office/drawing/2014/main" id="{D46A2896-3FBD-4B69-B293-7B8B3F8419DD}"/>
+              </a:ext>
+            </a:extLst>
+          </p:cNvPr>
+          <p:cNvSpPr txBox="1"/>
+          <p:nvPr/>
+        </p:nvSpPr>
+        <p:spPr>
+          <a:xfrm>
+            <a:off x="2015635" y="3114290"/>
+            <a:ext cx="1224136" cy="338554"/>
+          </a:xfrm>
+          <a:prstGeom prst="rect">
+            <a:avLst/>
+          </a:prstGeom>
+          <a:noFill/>
+        </p:spPr>
+        <p:txBody>
+          <a:bodyPr wrap="square" rtlCol="0">
+            <a:spAutoFit/>
+          </a:bodyPr>
+          <a:lstStyle/>
+          <a:p>
+            <a:r>
+              <a:rPr lang="de-DE" sz="800" dirty="0"/>
+              <a:t>[normal, </a:t>
+            </a:r>
+            <a:r>
+              <a:rPr lang="de-DE" sz="800" dirty="0" err="1"/>
+              <a:t>min_asymm</a:t>
+            </a:r>
+            <a:r>
+              <a:rPr lang="de-DE" sz="800" dirty="0"/>
+              <a:t>, </a:t>
+            </a:r>
+            <a:r>
+              <a:rPr lang="de-DE" sz="800" dirty="0" err="1"/>
+              <a:t>asymm</a:t>
+            </a:r>
+            <a:r>
+              <a:rPr lang="de-DE" sz="800" dirty="0"/>
+              <a:t>]</a:t>
+            </a:r>
+          </a:p>
+        </p:txBody>
+      </p:sp>
+      <p:sp>
+        <p:nvSpPr>
+          <p:cNvPr id="39" name="Textfeld 38">
+            <a:extLst>
+              <a:ext uri="{FF2B5EF4-FFF2-40B4-BE49-F238E27FC236}">
+                <a16:creationId xmlns:a16="http://schemas.microsoft.com/office/drawing/2014/main" id="{6D0B0B93-3340-4197-83C3-B0A278693B48}"/>
+              </a:ext>
+            </a:extLst>
+          </p:cNvPr>
+          <p:cNvSpPr txBox="1"/>
+          <p:nvPr/>
+        </p:nvSpPr>
+        <p:spPr>
+          <a:xfrm>
+            <a:off x="3297988" y="3113625"/>
+            <a:ext cx="1255136" cy="338554"/>
+          </a:xfrm>
+          <a:prstGeom prst="rect">
+            <a:avLst/>
+          </a:prstGeom>
+          <a:noFill/>
+        </p:spPr>
+        <p:txBody>
+          <a:bodyPr wrap="square" rtlCol="0">
+            <a:spAutoFit/>
+          </a:bodyPr>
+          <a:lstStyle/>
+          <a:p>
+            <a:r>
+              <a:rPr lang="de-DE" sz="800" dirty="0"/>
+              <a:t>[</a:t>
+            </a:r>
+            <a:r>
+              <a:rPr lang="de-DE" sz="800" dirty="0" err="1"/>
+              <a:t>complete</a:t>
+            </a:r>
+            <a:r>
+              <a:rPr lang="de-DE" sz="800" dirty="0"/>
+              <a:t>, </a:t>
+            </a:r>
+            <a:r>
+              <a:rPr lang="de-DE" sz="800" dirty="0" err="1"/>
+              <a:t>incomplete</a:t>
+            </a:r>
+            <a:r>
+              <a:rPr lang="de-DE" sz="800" dirty="0"/>
+              <a:t>]</a:t>
+            </a:r>
+          </a:p>
+        </p:txBody>
+      </p:sp>
+      <p:sp>
+        <p:nvSpPr>
+          <p:cNvPr id="40" name="Textfeld 39">
+            <a:extLst>
+              <a:ext uri="{FF2B5EF4-FFF2-40B4-BE49-F238E27FC236}">
+                <a16:creationId xmlns:a16="http://schemas.microsoft.com/office/drawing/2014/main" id="{FF12CD31-B3C6-4796-847C-09D942C98DB8}"/>
+              </a:ext>
+            </a:extLst>
+          </p:cNvPr>
+          <p:cNvSpPr txBox="1"/>
+          <p:nvPr/>
+        </p:nvSpPr>
+        <p:spPr>
+          <a:xfrm>
+            <a:off x="4581476" y="3071765"/>
+            <a:ext cx="1224133" cy="338554"/>
+          </a:xfrm>
+          <a:prstGeom prst="rect">
+            <a:avLst/>
+          </a:prstGeom>
+          <a:noFill/>
+        </p:spPr>
+        <p:txBody>
+          <a:bodyPr wrap="square" rtlCol="0">
+            <a:spAutoFit/>
+          </a:bodyPr>
+          <a:lstStyle/>
+          <a:p>
+            <a:r>
+              <a:rPr lang="de-DE" sz="800" dirty="0"/>
+              <a:t>[normal, </a:t>
+            </a:r>
+            <a:r>
+              <a:rPr lang="de-DE" sz="800" dirty="0" err="1"/>
+              <a:t>min_asymm</a:t>
+            </a:r>
+            <a:r>
+              <a:rPr lang="de-DE" sz="800" dirty="0"/>
+              <a:t>, </a:t>
+            </a:r>
+            <a:r>
+              <a:rPr lang="de-DE" sz="800" dirty="0" err="1"/>
+              <a:t>asymm</a:t>
+            </a:r>
+            <a:r>
+              <a:rPr lang="de-DE" sz="800" dirty="0"/>
+              <a:t>]</a:t>
+            </a:r>
+          </a:p>
+        </p:txBody>
+      </p:sp>
+      <p:sp>
+        <p:nvSpPr>
+          <p:cNvPr id="41" name="Textfeld 40">
+            <a:extLst>
+              <a:ext uri="{FF2B5EF4-FFF2-40B4-BE49-F238E27FC236}">
+                <a16:creationId xmlns:a16="http://schemas.microsoft.com/office/drawing/2014/main" id="{6853C277-2524-4577-9FC3-182080CF2F29}"/>
+              </a:ext>
+            </a:extLst>
+          </p:cNvPr>
+          <p:cNvSpPr txBox="1"/>
+          <p:nvPr/>
+        </p:nvSpPr>
+        <p:spPr>
+          <a:xfrm>
+            <a:off x="5816650" y="3120396"/>
+            <a:ext cx="1224133" cy="338554"/>
+          </a:xfrm>
+          <a:prstGeom prst="rect">
+            <a:avLst/>
+          </a:prstGeom>
+          <a:noFill/>
+        </p:spPr>
+        <p:txBody>
+          <a:bodyPr wrap="square" rtlCol="0">
+            <a:spAutoFit/>
+          </a:bodyPr>
+          <a:lstStyle/>
+          <a:p>
+            <a:r>
+              <a:rPr lang="de-DE" sz="800" dirty="0"/>
+              <a:t>[normal, </a:t>
+            </a:r>
+            <a:r>
+              <a:rPr lang="de-DE" sz="800" dirty="0" err="1"/>
+              <a:t>min_asymm</a:t>
+            </a:r>
+            <a:r>
+              <a:rPr lang="de-DE" sz="800" dirty="0"/>
+              <a:t>, </a:t>
+            </a:r>
+            <a:r>
+              <a:rPr lang="de-DE" sz="800" dirty="0" err="1"/>
+              <a:t>asymm</a:t>
+            </a:r>
+            <a:r>
+              <a:rPr lang="de-DE" sz="800" dirty="0"/>
+              <a:t>]</a:t>
             </a:r>
           </a:p>
         </p:txBody>
@@ -11379,7 +11379,7 @@
           <a:p>
             <a:fld id="{F9370870-AF2F-4892-BDF8-7CA6CC836611}" type="datetime1">
               <a:rPr lang="de-DE" smtClean="0"/>
-              <a:t>15.10.2021</a:t>
+              <a:t>25.10.2021</a:t>
             </a:fld>
             <a:endParaRPr lang="de-DE" dirty="0"/>
           </a:p>
@@ -12203,8 +12203,8 @@
           </a:prstGeom>
         </p:spPr>
       </p:pic>
-      <mc:AlternateContent xmlns:mc="http://schemas.openxmlformats.org/markup-compatibility/2006">
-        <mc:Choice xmlns:p14="http://schemas.microsoft.com/office/powerpoint/2010/main" Requires="p14">
+      <mc:AlternateContent xmlns:mc="http://schemas.openxmlformats.org/markup-compatibility/2006" xmlns:p14="http://schemas.microsoft.com/office/powerpoint/2010/main">
+        <mc:Choice Requires="p14">
           <p:contentPart p14:bwMode="auto" r:id="rId4">
             <p14:nvContentPartPr>
               <p14:cNvPr id="3" name="Freihand 2">
@@ -12223,7 +12223,7 @@
             </p14:xfrm>
           </p:contentPart>
         </mc:Choice>
-        <mc:Fallback>
+        <mc:Fallback xmlns="">
           <p:pic>
             <p:nvPicPr>
               <p:cNvPr id="3" name="Freihand 2">
@@ -13111,12 +13111,9 @@
 </file>
 
 <file path=customXml/item1.xml><?xml version="1.0" encoding="utf-8"?>
-<?mso-contentType ?>
-<FormTemplates xmlns="http://schemas.microsoft.com/sharepoint/v3/contenttype/forms">
-  <Display>DocumentLibraryForm</Display>
-  <Edit>DocumentLibraryForm</Edit>
-  <New>DocumentLibraryForm</New>
-</FormTemplates>
+<p:properties xmlns:p="http://schemas.microsoft.com/office/2006/metadata/properties" xmlns:xsi="http://www.w3.org/2001/XMLSchema-instance" xmlns:pc="http://schemas.microsoft.com/office/infopath/2007/PartnerControls">
+  <documentManagement/>
+</p:properties>
 </file>
 
 <file path=customXml/item2.xml><?xml version="1.0" encoding="utf-8"?>
@@ -13234,15 +13231,25 @@
 </file>
 
 <file path=customXml/item3.xml><?xml version="1.0" encoding="utf-8"?>
-<p:properties xmlns:p="http://schemas.microsoft.com/office/2006/metadata/properties" xmlns:xsi="http://www.w3.org/2001/XMLSchema-instance" xmlns:pc="http://schemas.microsoft.com/office/infopath/2007/PartnerControls">
-  <documentManagement/>
-</p:properties>
+<?mso-contentType ?>
+<FormTemplates xmlns="http://schemas.microsoft.com/sharepoint/v3/contenttype/forms">
+  <Display>DocumentLibraryForm</Display>
+  <Edit>DocumentLibraryForm</Edit>
+  <New>DocumentLibraryForm</New>
+</FormTemplates>
 </file>
 
 <file path=customXml/itemProps1.xml><?xml version="1.0" encoding="utf-8"?>
-<ds:datastoreItem xmlns:ds="http://schemas.openxmlformats.org/officeDocument/2006/customXml" ds:itemID="{20CAF0C3-C893-4631-969E-805C1C12F17E}">
+<ds:datastoreItem xmlns:ds="http://schemas.openxmlformats.org/officeDocument/2006/customXml" ds:itemID="{6F65AD01-48E5-4010-AD48-B7D7CFBD789F}">
   <ds:schemaRefs>
-    <ds:schemaRef ds:uri="http://schemas.microsoft.com/sharepoint/v3/contenttype/forms"/>
+    <ds:schemaRef ds:uri="http://schemas.microsoft.com/office/2006/documentManagement/types"/>
+    <ds:schemaRef ds:uri="http://schemas.microsoft.com/office/infopath/2007/PartnerControls"/>
+    <ds:schemaRef ds:uri="http://www.w3.org/XML/1998/namespace"/>
+    <ds:schemaRef ds:uri="http://schemas.microsoft.com/office/2006/metadata/properties"/>
+    <ds:schemaRef ds:uri="http://purl.org/dc/elements/1.1/"/>
+    <ds:schemaRef ds:uri="http://purl.org/dc/dcmitype/"/>
+    <ds:schemaRef ds:uri="http://schemas.openxmlformats.org/package/2006/metadata/core-properties"/>
+    <ds:schemaRef ds:uri="http://purl.org/dc/terms/"/>
   </ds:schemaRefs>
 </ds:datastoreItem>
 </file>
@@ -13264,16 +13271,9 @@
 </file>
 
 <file path=customXml/itemProps3.xml><?xml version="1.0" encoding="utf-8"?>
-<ds:datastoreItem xmlns:ds="http://schemas.openxmlformats.org/officeDocument/2006/customXml" ds:itemID="{6F65AD01-48E5-4010-AD48-B7D7CFBD789F}">
+<ds:datastoreItem xmlns:ds="http://schemas.openxmlformats.org/officeDocument/2006/customXml" ds:itemID="{20CAF0C3-C893-4631-969E-805C1C12F17E}">
   <ds:schemaRefs>
-    <ds:schemaRef ds:uri="http://schemas.microsoft.com/office/2006/documentManagement/types"/>
-    <ds:schemaRef ds:uri="http://schemas.microsoft.com/office/infopath/2007/PartnerControls"/>
-    <ds:schemaRef ds:uri="http://www.w3.org/XML/1998/namespace"/>
-    <ds:schemaRef ds:uri="http://schemas.microsoft.com/office/2006/metadata/properties"/>
-    <ds:schemaRef ds:uri="http://purl.org/dc/elements/1.1/"/>
-    <ds:schemaRef ds:uri="http://purl.org/dc/dcmitype/"/>
-    <ds:schemaRef ds:uri="http://schemas.openxmlformats.org/package/2006/metadata/core-properties"/>
-    <ds:schemaRef ds:uri="http://purl.org/dc/terms/"/>
+    <ds:schemaRef ds:uri="http://schemas.microsoft.com/sharepoint/v3/contenttype/forms"/>
   </ds:schemaRefs>
 </ds:datastoreItem>
 </file>
</xml_diff>